<commit_message>
Updated solution file to remove projects now in obsolete branch
</commit_message>
<xml_diff>
--- a/Slides/San Francisco SemWeb Meetup Talk Dec 2012.pptx
+++ b/Slides/San Francisco SemWeb Meetup Talk Dec 2012.pptx
@@ -202,7 +202,7 @@
             <a:fld id="{A4EFCF4D-B222-4BDE-9F21-361A6D2DD5DC}" type="datetimeFigureOut">
               <a:rPr lang="en-GB" smtClean="0"/>
               <a:pPr/>
-              <a:t>04/12/2011</a:t>
+              <a:t>06/12/2011</a:t>
             </a:fld>
             <a:endParaRPr lang="en-GB"/>
           </a:p>
@@ -371,7 +371,7 @@
     </p:spTree>
     <p:extLst>
       <p:ext uri="{BB962C8B-B14F-4D97-AF65-F5344CB8AC3E}">
-        <p14:creationId xmlns:p14="http://schemas.microsoft.com/office/powerpoint/2010/main" val="3764111685"/>
+        <p14:creationId xmlns:p14="http://schemas.microsoft.com/office/powerpoint/2010/main" xmlns="" val="3764111685"/>
       </p:ext>
     </p:extLst>
   </p:cSld>
@@ -3441,8 +3441,28 @@
             </a:r>
             <a:r>
               <a:rPr lang="en-GB" dirty="0" smtClean="0"/>
-              <a:t> Toolkit)</a:t>
-            </a:r>
+              <a:t> Toolkit</a:t>
+            </a:r>
+            <a:r>
+              <a:rPr lang="en-GB" dirty="0" smtClean="0"/>
+              <a:t>)</a:t>
+            </a:r>
+          </a:p>
+          <a:p>
+            <a:pPr lvl="1"/>
+            <a:r>
+              <a:rPr lang="en-GB" dirty="0" smtClean="0"/>
+              <a:t>Twinkle (by Leigh </a:t>
+            </a:r>
+            <a:r>
+              <a:rPr lang="en-GB" dirty="0" err="1" smtClean="0"/>
+              <a:t>Dodds</a:t>
+            </a:r>
+            <a:r>
+              <a:rPr lang="en-GB" smtClean="0"/>
+              <a:t>)</a:t>
+            </a:r>
+            <a:endParaRPr lang="en-GB" dirty="0" smtClean="0"/>
           </a:p>
           <a:p>
             <a:r>
@@ -3533,7 +3553,7 @@
     </p:spTree>
     <p:extLst>
       <p:ext uri="{BB962C8B-B14F-4D97-AF65-F5344CB8AC3E}">
-        <p14:creationId xmlns:p14="http://schemas.microsoft.com/office/powerpoint/2010/main" val="991143639"/>
+        <p14:creationId xmlns:p14="http://schemas.microsoft.com/office/powerpoint/2010/main" xmlns="" val="991143639"/>
       </p:ext>
     </p:extLst>
   </p:cSld>
@@ -3615,17 +3635,8 @@
           <a:p>
             <a:r>
               <a:rPr lang="en-GB" dirty="0" smtClean="0"/>
-              <a:t>Writing </a:t>
-            </a:r>
-            <a:r>
-              <a:rPr lang="en-GB" dirty="0" smtClean="0"/>
-              <a:t>up my PhD </a:t>
-            </a:r>
-            <a:r>
-              <a:rPr lang="en-GB" dirty="0" smtClean="0"/>
-              <a:t>Thesis in spare time</a:t>
-            </a:r>
-            <a:endParaRPr lang="en-GB" dirty="0" smtClean="0"/>
+              <a:t>Writing up my PhD Thesis in spare time</a:t>
+            </a:r>
           </a:p>
           <a:p>
             <a:pPr lvl="1"/>
@@ -3659,39 +3670,21 @@
             <a:pPr lvl="1"/>
             <a:r>
               <a:rPr lang="en-GB" dirty="0" smtClean="0"/>
-              <a:t>Latest</a:t>
-            </a:r>
-            <a:r>
-              <a:rPr lang="en-GB" dirty="0" smtClean="0"/>
-              <a:t> Releases</a:t>
-            </a:r>
-            <a:endParaRPr lang="en-GB" dirty="0" smtClean="0"/>
+              <a:t>Latest Releases</a:t>
+            </a:r>
           </a:p>
           <a:p>
             <a:pPr lvl="2"/>
             <a:r>
               <a:rPr lang="en-GB" dirty="0" smtClean="0"/>
-              <a:t>0.5.1 </a:t>
-            </a:r>
-            <a:r>
-              <a:rPr lang="en-GB" dirty="0" smtClean="0"/>
-              <a:t>Beta (</a:t>
-            </a:r>
-            <a:r>
-              <a:rPr lang="en-GB" dirty="0" smtClean="0"/>
-              <a:t>APIs)</a:t>
-            </a:r>
-            <a:endParaRPr lang="en-GB" dirty="0" smtClean="0"/>
+              <a:t>0.5.1 Beta (APIs)</a:t>
+            </a:r>
           </a:p>
           <a:p>
             <a:pPr lvl="2"/>
             <a:r>
               <a:rPr lang="en-GB" dirty="0" smtClean="0"/>
-              <a:t>0.4.0 Beta (Toolkit</a:t>
-            </a:r>
-            <a:r>
-              <a:rPr lang="en-GB" dirty="0" smtClean="0"/>
-              <a:t>)</a:t>
+              <a:t>0.4.0 Beta (Toolkit)</a:t>
             </a:r>
             <a:endParaRPr lang="en-GB" dirty="0"/>
           </a:p>
@@ -3770,7 +3763,7 @@
     </p:spTree>
     <p:extLst>
       <p:ext uri="{BB962C8B-B14F-4D97-AF65-F5344CB8AC3E}">
-        <p14:creationId xmlns:p14="http://schemas.microsoft.com/office/powerpoint/2010/main" val="1040737737"/>
+        <p14:creationId xmlns:p14="http://schemas.microsoft.com/office/powerpoint/2010/main" xmlns="" val="1040737737"/>
       </p:ext>
     </p:extLst>
   </p:cSld>
@@ -3850,15 +3843,7 @@
           <a:p>
             <a:r>
               <a:rPr lang="en-GB" dirty="0" smtClean="0"/>
-              <a:t>Was frustrated by limited tooling around conversion, query </a:t>
-            </a:r>
-            <a:r>
-              <a:rPr lang="en-GB" dirty="0" smtClean="0"/>
-              <a:t>prototyping and </a:t>
-            </a:r>
-            <a:r>
-              <a:rPr lang="en-GB" dirty="0" smtClean="0"/>
-              <a:t>editing</a:t>
+              <a:t>Was frustrated by limited tooling around conversion, query prototyping and editing</a:t>
             </a:r>
           </a:p>
           <a:p>
@@ -3958,7 +3943,7 @@
     </p:spTree>
     <p:extLst>
       <p:ext uri="{BB962C8B-B14F-4D97-AF65-F5344CB8AC3E}">
-        <p14:creationId xmlns:p14="http://schemas.microsoft.com/office/powerpoint/2010/main" val="4125537842"/>
+        <p14:creationId xmlns:p14="http://schemas.microsoft.com/office/powerpoint/2010/main" xmlns="" val="4125537842"/>
       </p:ext>
     </p:extLst>
   </p:cSld>
@@ -4151,7 +4136,7 @@
     </p:spTree>
     <p:extLst>
       <p:ext uri="{BB962C8B-B14F-4D97-AF65-F5344CB8AC3E}">
-        <p14:creationId xmlns:p14="http://schemas.microsoft.com/office/powerpoint/2010/main" val="2526724232"/>
+        <p14:creationId xmlns:p14="http://schemas.microsoft.com/office/powerpoint/2010/main" xmlns="" val="2526724232"/>
       </p:ext>
     </p:extLst>
   </p:cSld>
@@ -4353,7 +4338,7 @@
     </p:spTree>
     <p:extLst>
       <p:ext uri="{BB962C8B-B14F-4D97-AF65-F5344CB8AC3E}">
-        <p14:creationId xmlns:p14="http://schemas.microsoft.com/office/powerpoint/2010/main" val="664525842"/>
+        <p14:creationId xmlns:p14="http://schemas.microsoft.com/office/powerpoint/2010/main" xmlns="" val="664525842"/>
       </p:ext>
     </p:extLst>
   </p:cSld>
@@ -4465,26 +4450,13 @@
           <a:p>
             <a:r>
               <a:rPr lang="en-GB" dirty="0" smtClean="0"/>
-              <a:t>Windows only – Mono does not support the required APIs </a:t>
-            </a:r>
-            <a:r>
-              <a:rPr lang="en-GB" dirty="0" smtClean="0"/>
-              <a:t>unfortunately</a:t>
-            </a:r>
-            <a:endParaRPr lang="en-GB" dirty="0" smtClean="0"/>
-          </a:p>
-          <a:p>
-            <a:r>
-              <a:rPr lang="en-GB" dirty="0" smtClean="0"/>
-              <a:t>Notepad replacement for RDF </a:t>
-            </a:r>
-            <a:r>
-              <a:rPr lang="en-GB" dirty="0" smtClean="0"/>
-              <a:t>editing </a:t>
-            </a:r>
-            <a:r>
-              <a:rPr lang="en-GB" dirty="0" smtClean="0"/>
-              <a:t>with syntax highlighting, auto-complete and validation capabilities</a:t>
+              <a:t>Windows only – Mono does not support the required APIs unfortunately</a:t>
+            </a:r>
+          </a:p>
+          <a:p>
+            <a:r>
+              <a:rPr lang="en-GB" dirty="0" smtClean="0"/>
+              <a:t>Notepad replacement for RDF editing with syntax highlighting, auto-complete and validation capabilities</a:t>
             </a:r>
           </a:p>
         </p:txBody>
@@ -4562,7 +4534,7 @@
     </p:spTree>
     <p:extLst>
       <p:ext uri="{BB962C8B-B14F-4D97-AF65-F5344CB8AC3E}">
-        <p14:creationId xmlns:p14="http://schemas.microsoft.com/office/powerpoint/2010/main" val="156102642"/>
+        <p14:creationId xmlns:p14="http://schemas.microsoft.com/office/powerpoint/2010/main" xmlns="" val="156102642"/>
       </p:ext>
     </p:extLst>
   </p:cSld>
@@ -4770,7 +4742,7 @@
     </p:spTree>
     <p:extLst>
       <p:ext uri="{BB962C8B-B14F-4D97-AF65-F5344CB8AC3E}">
-        <p14:creationId xmlns:p14="http://schemas.microsoft.com/office/powerpoint/2010/main" val="2049121592"/>
+        <p14:creationId xmlns:p14="http://schemas.microsoft.com/office/powerpoint/2010/main" xmlns="" val="2049121592"/>
       </p:ext>
     </p:extLst>
   </p:cSld>
@@ -4821,15 +4793,7 @@
           <a:p>
             <a:r>
               <a:rPr lang="en-GB" dirty="0" smtClean="0"/>
-              <a:t>Management - </a:t>
-            </a:r>
-            <a:r>
-              <a:rPr lang="en-GB" dirty="0" smtClean="0"/>
-              <a:t>Store </a:t>
-            </a:r>
-            <a:r>
-              <a:rPr lang="en-GB" dirty="0" smtClean="0"/>
-              <a:t>Manager</a:t>
+              <a:t>Management - Store Manager</a:t>
             </a:r>
             <a:endParaRPr lang="en-GB" dirty="0"/>
           </a:p>
@@ -4971,7 +4935,7 @@
     </p:spTree>
     <p:extLst>
       <p:ext uri="{BB962C8B-B14F-4D97-AF65-F5344CB8AC3E}">
-        <p14:creationId xmlns:p14="http://schemas.microsoft.com/office/powerpoint/2010/main" val="2930425621"/>
+        <p14:creationId xmlns:p14="http://schemas.microsoft.com/office/powerpoint/2010/main" xmlns="" val="2930425621"/>
       </p:ext>
     </p:extLst>
   </p:cSld>
@@ -5067,7 +5031,7 @@
     </p:spTree>
     <p:extLst>
       <p:ext uri="{BB962C8B-B14F-4D97-AF65-F5344CB8AC3E}">
-        <p14:creationId xmlns:p14="http://schemas.microsoft.com/office/powerpoint/2010/main" val="3679833452"/>
+        <p14:creationId xmlns:p14="http://schemas.microsoft.com/office/powerpoint/2010/main" xmlns="" val="3679833452"/>
       </p:ext>
     </p:extLst>
   </p:cSld>

</xml_diff>